<commit_message>
Added missing presentation files, forgot them on last commit
</commit_message>
<xml_diff>
--- a/Starshooter.pptx
+++ b/Starshooter.pptx
@@ -6,10 +6,10 @@
     <p:sldMasterId id="2147483649" r:id="rId2"/>
   </p:sldMasterIdLst>
   <p:notesMasterIdLst>
-    <p:notesMasterId r:id="rId15"/>
+    <p:notesMasterId r:id="rId16"/>
   </p:notesMasterIdLst>
   <p:handoutMasterIdLst>
-    <p:handoutMasterId r:id="rId16"/>
+    <p:handoutMasterId r:id="rId17"/>
   </p:handoutMasterIdLst>
   <p:sldIdLst>
     <p:sldId id="256" r:id="rId3"/>
@@ -23,17 +23,18 @@
     <p:sldId id="310" r:id="rId11"/>
     <p:sldId id="311" r:id="rId12"/>
     <p:sldId id="312" r:id="rId13"/>
-    <p:sldId id="305" r:id="rId14"/>
+    <p:sldId id="316" r:id="rId14"/>
+    <p:sldId id="305" r:id="rId15"/>
   </p:sldIdLst>
   <p:sldSz cx="9144000" cy="6858000" type="screen4x3"/>
   <p:notesSz cx="10234613" cy="7099300"/>
   <p:embeddedFontLst>
     <p:embeddedFont>
       <p:font typeface="DejaVu Sans" charset="0"/>
-      <p:regular r:id="rId17"/>
-      <p:bold r:id="rId18"/>
-      <p:italic r:id="rId19"/>
-      <p:boldItalic r:id="rId20"/>
+      <p:regular r:id="rId18"/>
+      <p:bold r:id="rId19"/>
+      <p:italic r:id="rId20"/>
+      <p:boldItalic r:id="rId21"/>
     </p:embeddedFont>
   </p:embeddedFontLst>
   <p:defaultTextStyle>
@@ -272,7 +273,7 @@
             <a:fld id="{95B0DEE6-A072-4929-A7C4-A7EB41EC0EDD}" type="datetimeFigureOut">
               <a:rPr lang="de-CH" smtClean="0"/>
               <a:pPr/>
-              <a:t>27.03.2012</a:t>
+              <a:t>02.04.2012</a:t>
             </a:fld>
             <a:endParaRPr lang="de-CH"/>
           </a:p>
@@ -4168,7 +4169,7 @@
           <a:bodyPr wrap="none" anchor="ctr"/>
           <a:lstStyle/>
           <a:p>
-            <a:endParaRPr lang="de-CH"/>
+            <a:endParaRPr lang="en-US" noProof="0"/>
           </a:p>
         </p:txBody>
       </p:sp>
@@ -4226,16 +4227,16 @@
               </a:tabLst>
             </a:pPr>
             <a:r>
-              <a:rPr lang="de-DE" sz="800" dirty="0">
+              <a:rPr lang="en-US" sz="800" noProof="0" dirty="0" smtClean="0">
                 <a:solidFill>
                   <a:srgbClr val="000000"/>
                 </a:solidFill>
                 <a:latin typeface="Arial" charset="0"/>
               </a:rPr>
-              <a:t>Folie </a:t>
+              <a:t>Slide </a:t>
             </a:r>
             <a:fld id="{0789FCE0-52FF-4EE2-8388-A0F9070276B6}" type="slidenum">
-              <a:rPr lang="de-DE" sz="800">
+              <a:rPr lang="en-US" sz="800" noProof="0" smtClean="0">
                 <a:solidFill>
                   <a:srgbClr val="000000"/>
                 </a:solidFill>
@@ -4266,7 +4267,7 @@
               <a:t>‹Nr.›</a:t>
             </a:fld>
             <a:r>
-              <a:rPr lang="de-DE" sz="800" dirty="0">
+              <a:rPr lang="en-US" sz="800" noProof="0" dirty="0" smtClean="0">
                 <a:solidFill>
                   <a:srgbClr val="000000"/>
                 </a:solidFill>
@@ -4275,7 +4276,7 @@
               <a:t/>
             </a:r>
             <a:br>
-              <a:rPr lang="de-DE" sz="800" dirty="0">
+              <a:rPr lang="en-US" sz="800" noProof="0" dirty="0" smtClean="0">
                 <a:solidFill>
                   <a:srgbClr val="000000"/>
                 </a:solidFill>
@@ -4283,15 +4284,15 @@
               </a:rPr>
             </a:br>
             <a:r>
-              <a:rPr lang="de-DE" sz="800" dirty="0" smtClean="0">
+              <a:rPr lang="en-US" sz="800" noProof="0" dirty="0" smtClean="0">
                 <a:solidFill>
                   <a:srgbClr val="000000"/>
                 </a:solidFill>
                 <a:latin typeface="Arial" charset="0"/>
               </a:rPr>
-              <a:t>12.01.2011</a:t>
-            </a:r>
-            <a:endParaRPr lang="de-DE" sz="800" dirty="0">
+              <a:t>03.04.2012</a:t>
+            </a:r>
+            <a:endParaRPr lang="en-US" sz="800" noProof="0" dirty="0">
               <a:solidFill>
                 <a:srgbClr val="000000"/>
               </a:solidFill>
@@ -4337,42 +4338,10 @@
           <a:p>
             <a:pPr lvl="0"/>
             <a:r>
-              <a:rPr lang="en-GB" dirty="0" err="1" smtClean="0"/>
-              <a:t>Klicken</a:t>
-            </a:r>
-            <a:r>
-              <a:rPr lang="en-GB" dirty="0" smtClean="0"/>
-              <a:t> </a:t>
-            </a:r>
-            <a:r>
-              <a:rPr lang="en-GB" dirty="0" err="1" smtClean="0"/>
-              <a:t>Sie</a:t>
-            </a:r>
-            <a:r>
-              <a:rPr lang="en-GB" dirty="0" smtClean="0"/>
-              <a:t>, um das Format des </a:t>
-            </a:r>
-            <a:r>
-              <a:rPr lang="en-GB" dirty="0" err="1" smtClean="0"/>
-              <a:t>Titeltextes</a:t>
-            </a:r>
-            <a:r>
-              <a:rPr lang="en-GB" dirty="0" smtClean="0"/>
-              <a:t> </a:t>
-            </a:r>
-            <a:r>
-              <a:rPr lang="en-GB" dirty="0" err="1" smtClean="0"/>
-              <a:t>zu</a:t>
-            </a:r>
-            <a:r>
-              <a:rPr lang="en-GB" dirty="0" smtClean="0"/>
-              <a:t> </a:t>
-            </a:r>
-            <a:r>
-              <a:rPr lang="en-GB" dirty="0" err="1" smtClean="0"/>
-              <a:t>bearbeiten</a:t>
-            </a:r>
-            <a:endParaRPr lang="en-GB" dirty="0" smtClean="0"/>
+              <a:rPr lang="en-US" noProof="0" smtClean="0"/>
+              <a:t>Klicken Sie, um das Format des Titeltextes zu bearbeiten</a:t>
+            </a:r>
+            <a:endParaRPr lang="en-US" noProof="0" smtClean="0"/>
           </a:p>
         </p:txBody>
       </p:sp>
@@ -4413,178 +4382,66 @@
           <a:p>
             <a:pPr lvl="0"/>
             <a:r>
-              <a:rPr lang="en-GB" dirty="0" err="1" smtClean="0"/>
-              <a:t>Klicken</a:t>
-            </a:r>
-            <a:r>
-              <a:rPr lang="en-GB" dirty="0" smtClean="0"/>
-              <a:t> </a:t>
-            </a:r>
-            <a:r>
-              <a:rPr lang="en-GB" dirty="0" err="1" smtClean="0"/>
-              <a:t>Sie</a:t>
-            </a:r>
-            <a:r>
-              <a:rPr lang="en-GB" dirty="0" smtClean="0"/>
-              <a:t>, um die </a:t>
-            </a:r>
-            <a:r>
-              <a:rPr lang="en-GB" dirty="0" err="1" smtClean="0"/>
-              <a:t>Formate</a:t>
-            </a:r>
-            <a:r>
-              <a:rPr lang="en-GB" dirty="0" smtClean="0"/>
-              <a:t> des </a:t>
-            </a:r>
-            <a:r>
-              <a:rPr lang="en-GB" dirty="0" err="1" smtClean="0"/>
-              <a:t>Gliederungstextes</a:t>
-            </a:r>
-            <a:r>
-              <a:rPr lang="en-GB" dirty="0" smtClean="0"/>
-              <a:t> </a:t>
-            </a:r>
-            <a:r>
-              <a:rPr lang="en-GB" dirty="0" err="1" smtClean="0"/>
-              <a:t>zu</a:t>
-            </a:r>
-            <a:r>
-              <a:rPr lang="en-GB" dirty="0" smtClean="0"/>
-              <a:t> </a:t>
-            </a:r>
-            <a:r>
-              <a:rPr lang="en-GB" dirty="0" err="1" smtClean="0"/>
-              <a:t>bearbeiten</a:t>
-            </a:r>
-            <a:endParaRPr lang="en-GB" dirty="0" smtClean="0"/>
+              <a:rPr lang="en-US" noProof="0" smtClean="0"/>
+              <a:t>Klicken Sie, um die Formate des Gliederungstextes zu bearbeiten</a:t>
+            </a:r>
           </a:p>
           <a:p>
             <a:pPr lvl="1"/>
             <a:r>
-              <a:rPr lang="en-GB" dirty="0" err="1" smtClean="0"/>
-              <a:t>Zweite</a:t>
-            </a:r>
-            <a:r>
-              <a:rPr lang="en-GB" dirty="0" smtClean="0"/>
-              <a:t> </a:t>
-            </a:r>
-            <a:r>
-              <a:rPr lang="en-GB" dirty="0" err="1" smtClean="0"/>
-              <a:t>Gliederungsebene</a:t>
-            </a:r>
-            <a:endParaRPr lang="en-GB" dirty="0" smtClean="0"/>
+              <a:rPr lang="en-US" noProof="0" smtClean="0"/>
+              <a:t>Zweite Gliederungsebene</a:t>
+            </a:r>
           </a:p>
           <a:p>
             <a:pPr lvl="2"/>
             <a:r>
-              <a:rPr lang="en-GB" dirty="0" err="1" smtClean="0"/>
-              <a:t>Dritte</a:t>
-            </a:r>
-            <a:r>
-              <a:rPr lang="en-GB" dirty="0" smtClean="0"/>
-              <a:t> </a:t>
-            </a:r>
-            <a:r>
-              <a:rPr lang="en-GB" dirty="0" err="1" smtClean="0"/>
-              <a:t>Gliederungsebene</a:t>
-            </a:r>
-            <a:endParaRPr lang="en-GB" dirty="0" smtClean="0"/>
+              <a:rPr lang="en-US" noProof="0" smtClean="0"/>
+              <a:t>Dritte Gliederungsebene</a:t>
+            </a:r>
           </a:p>
           <a:p>
             <a:pPr lvl="3"/>
             <a:r>
-              <a:rPr lang="en-GB" dirty="0" err="1" smtClean="0"/>
-              <a:t>Vierte</a:t>
-            </a:r>
-            <a:r>
-              <a:rPr lang="en-GB" dirty="0" smtClean="0"/>
-              <a:t> </a:t>
-            </a:r>
-            <a:r>
-              <a:rPr lang="en-GB" dirty="0" err="1" smtClean="0"/>
-              <a:t>Gliederungsebene</a:t>
-            </a:r>
-            <a:endParaRPr lang="en-GB" dirty="0" smtClean="0"/>
+              <a:rPr lang="en-US" noProof="0" smtClean="0"/>
+              <a:t>Vierte Gliederungsebene</a:t>
+            </a:r>
           </a:p>
           <a:p>
             <a:pPr lvl="4"/>
             <a:r>
-              <a:rPr lang="en-GB" dirty="0" err="1" smtClean="0"/>
-              <a:t>Fünfte</a:t>
-            </a:r>
-            <a:r>
-              <a:rPr lang="en-GB" dirty="0" smtClean="0"/>
-              <a:t> </a:t>
-            </a:r>
-            <a:r>
-              <a:rPr lang="en-GB" dirty="0" err="1" smtClean="0"/>
-              <a:t>Gliederungsebene</a:t>
-            </a:r>
-            <a:endParaRPr lang="en-GB" dirty="0" smtClean="0"/>
+              <a:rPr lang="en-US" noProof="0" smtClean="0"/>
+              <a:t>Fünfte Gliederungsebene</a:t>
+            </a:r>
           </a:p>
           <a:p>
             <a:pPr lvl="4"/>
             <a:r>
-              <a:rPr lang="en-GB" dirty="0" err="1" smtClean="0"/>
-              <a:t>Sechste</a:t>
-            </a:r>
-            <a:r>
-              <a:rPr lang="en-GB" dirty="0" smtClean="0"/>
-              <a:t> </a:t>
-            </a:r>
-            <a:r>
-              <a:rPr lang="en-GB" dirty="0" err="1" smtClean="0"/>
-              <a:t>Gliederungsebene</a:t>
-            </a:r>
-            <a:endParaRPr lang="en-GB" dirty="0" smtClean="0"/>
+              <a:rPr lang="en-US" noProof="0" smtClean="0"/>
+              <a:t>Sechste Gliederungsebene</a:t>
+            </a:r>
           </a:p>
           <a:p>
             <a:pPr lvl="4"/>
             <a:r>
-              <a:rPr lang="en-GB" dirty="0" err="1" smtClean="0"/>
-              <a:t>Siebente</a:t>
-            </a:r>
-            <a:r>
-              <a:rPr lang="en-GB" dirty="0" smtClean="0"/>
-              <a:t> </a:t>
-            </a:r>
-            <a:r>
-              <a:rPr lang="en-GB" dirty="0" err="1" smtClean="0"/>
-              <a:t>Gliederungsebene</a:t>
-            </a:r>
-            <a:endParaRPr lang="en-GB" dirty="0" smtClean="0"/>
+              <a:rPr lang="en-US" noProof="0" smtClean="0"/>
+              <a:t>Siebente Gliederungsebene</a:t>
+            </a:r>
           </a:p>
           <a:p>
             <a:pPr lvl="4"/>
             <a:r>
-              <a:rPr lang="en-GB" dirty="0" err="1" smtClean="0"/>
-              <a:t>Achte</a:t>
-            </a:r>
-            <a:r>
-              <a:rPr lang="en-GB" dirty="0" smtClean="0"/>
-              <a:t> </a:t>
-            </a:r>
-            <a:r>
-              <a:rPr lang="en-GB" dirty="0" err="1" smtClean="0"/>
-              <a:t>Gliederungsebene</a:t>
-            </a:r>
-            <a:endParaRPr lang="en-GB" dirty="0" smtClean="0"/>
+              <a:rPr lang="en-US" noProof="0" smtClean="0"/>
+              <a:t>Achte Gliederungsebene</a:t>
+            </a:r>
           </a:p>
           <a:p>
             <a:pPr lvl="4"/>
             <a:r>
-              <a:rPr lang="en-GB" dirty="0" err="1" smtClean="0"/>
-              <a:t>Neunte</a:t>
-            </a:r>
-            <a:r>
-              <a:rPr lang="en-GB" dirty="0" smtClean="0"/>
-              <a:t> </a:t>
-            </a:r>
-            <a:r>
-              <a:rPr lang="en-GB" dirty="0" err="1" smtClean="0"/>
-              <a:t>Gliederungsebene</a:t>
-            </a:r>
-            <a:endParaRPr lang="en-GB" dirty="0" smtClean="0"/>
+              <a:rPr lang="en-US" noProof="0" smtClean="0"/>
+              <a:t>Neunte Gliederungsebene</a:t>
+            </a:r>
+            <a:endParaRPr lang="en-US" noProof="0" smtClean="0"/>
           </a:p>
         </p:txBody>
       </p:sp>
@@ -4662,7 +4519,7 @@
         </p:nvSpPr>
         <p:spPr>
           <a:xfrm>
-            <a:off x="3896883" y="6417891"/>
+            <a:off x="3603268" y="6417891"/>
             <a:ext cx="2177199" cy="246221"/>
           </a:xfrm>
           <a:prstGeom prst="rect">
@@ -4671,22 +4528,31 @@
           <a:noFill/>
         </p:spPr>
         <p:txBody>
-          <a:bodyPr wrap="none" rtlCol="0">
+          <a:bodyPr wrap="none" rtlCol="0" anchor="ctr" anchorCtr="0">
             <a:spAutoFit/>
           </a:bodyPr>
           <a:lstStyle/>
           <a:p>
             <a:r>
-              <a:rPr lang="de-CH" sz="1000" dirty="0" smtClean="0">
+              <a:rPr lang="en-US" sz="1000" noProof="0" dirty="0" err="1" smtClean="0">
                 <a:solidFill>
                   <a:schemeClr val="accent4"/>
                 </a:solidFill>
                 <a:latin typeface="+mn-lt"/>
               </a:rPr>
-              <a:t>Sascha </a:t>
-            </a:r>
-            <a:r>
-              <a:rPr lang="de-CH" sz="1000" dirty="0" err="1" smtClean="0">
+              <a:t>Sascha</a:t>
+            </a:r>
+            <a:r>
+              <a:rPr lang="en-US" sz="1000" noProof="0" dirty="0" smtClean="0">
+                <a:solidFill>
+                  <a:schemeClr val="accent4"/>
+                </a:solidFill>
+                <a:latin typeface="+mn-lt"/>
+              </a:rPr>
+              <a:t> </a:t>
+            </a:r>
+            <a:r>
+              <a:rPr lang="en-US" sz="1000" noProof="0" dirty="0" err="1" smtClean="0">
                 <a:solidFill>
                   <a:schemeClr val="accent4"/>
                 </a:solidFill>
@@ -4695,7 +4561,7 @@
               <a:t>Montellese</a:t>
             </a:r>
             <a:r>
-              <a:rPr lang="de-CH" sz="1000" baseline="0" dirty="0" smtClean="0">
+              <a:rPr lang="en-US" sz="1000" baseline="0" noProof="0" dirty="0" smtClean="0">
                 <a:solidFill>
                   <a:schemeClr val="accent4"/>
                 </a:solidFill>
@@ -4704,15 +4570,24 @@
               <a:t> &amp; </a:t>
             </a:r>
             <a:r>
-              <a:rPr lang="de-CH" sz="1000" dirty="0" smtClean="0">
+              <a:rPr lang="en-US" sz="1000" noProof="0" dirty="0" smtClean="0">
                 <a:solidFill>
                   <a:schemeClr val="accent4"/>
                 </a:solidFill>
                 <a:latin typeface="+mn-lt"/>
               </a:rPr>
-              <a:t>Daniel Mäder</a:t>
-            </a:r>
-            <a:endParaRPr lang="de-CH" sz="1000" dirty="0">
+              <a:t>Daniel </a:t>
+            </a:r>
+            <a:r>
+              <a:rPr lang="en-US" sz="1000" noProof="0" dirty="0" err="1" smtClean="0">
+                <a:solidFill>
+                  <a:schemeClr val="accent4"/>
+                </a:solidFill>
+                <a:latin typeface="+mn-lt"/>
+              </a:rPr>
+              <a:t>Mäder</a:t>
+            </a:r>
+            <a:endParaRPr lang="en-US" sz="1000" noProof="0" dirty="0">
               <a:solidFill>
                 <a:schemeClr val="accent4"/>
               </a:solidFill>
@@ -5291,9 +5166,10 @@
           <a:p>
             <a:pPr lvl="0"/>
             <a:r>
-              <a:rPr lang="en-GB" smtClean="0"/>
+              <a:rPr lang="en-US" noProof="0" smtClean="0"/>
               <a:t>Klicken Sie, um das Format des Titeltextes zu bearbeiten</a:t>
             </a:r>
+            <a:endParaRPr lang="en-US" noProof="0" smtClean="0"/>
           </a:p>
         </p:txBody>
       </p:sp>
@@ -5334,178 +5210,66 @@
           <a:p>
             <a:pPr lvl="0"/>
             <a:r>
-              <a:rPr lang="en-GB" dirty="0" err="1" smtClean="0"/>
-              <a:t>Klicken</a:t>
-            </a:r>
-            <a:r>
-              <a:rPr lang="en-GB" dirty="0" smtClean="0"/>
-              <a:t> </a:t>
-            </a:r>
-            <a:r>
-              <a:rPr lang="en-GB" dirty="0" err="1" smtClean="0"/>
-              <a:t>Sie</a:t>
-            </a:r>
-            <a:r>
-              <a:rPr lang="en-GB" dirty="0" smtClean="0"/>
-              <a:t>, um die </a:t>
-            </a:r>
-            <a:r>
-              <a:rPr lang="en-GB" dirty="0" err="1" smtClean="0"/>
-              <a:t>Formate</a:t>
-            </a:r>
-            <a:r>
-              <a:rPr lang="en-GB" dirty="0" smtClean="0"/>
-              <a:t> des </a:t>
-            </a:r>
-            <a:r>
-              <a:rPr lang="en-GB" dirty="0" err="1" smtClean="0"/>
-              <a:t>Gliederungstextes</a:t>
-            </a:r>
-            <a:r>
-              <a:rPr lang="en-GB" dirty="0" smtClean="0"/>
-              <a:t> </a:t>
-            </a:r>
-            <a:r>
-              <a:rPr lang="en-GB" dirty="0" err="1" smtClean="0"/>
-              <a:t>zu</a:t>
-            </a:r>
-            <a:r>
-              <a:rPr lang="en-GB" dirty="0" smtClean="0"/>
-              <a:t> </a:t>
-            </a:r>
-            <a:r>
-              <a:rPr lang="en-GB" dirty="0" err="1" smtClean="0"/>
-              <a:t>bearbeiten</a:t>
-            </a:r>
-            <a:endParaRPr lang="en-GB" dirty="0" smtClean="0"/>
+              <a:rPr lang="en-US" noProof="0" smtClean="0"/>
+              <a:t>Klicken Sie, um die Formate des Gliederungstextes zu bearbeiten</a:t>
+            </a:r>
           </a:p>
           <a:p>
             <a:pPr lvl="1"/>
             <a:r>
-              <a:rPr lang="en-GB" dirty="0" err="1" smtClean="0"/>
-              <a:t>Zweite</a:t>
-            </a:r>
-            <a:r>
-              <a:rPr lang="en-GB" dirty="0" smtClean="0"/>
-              <a:t> </a:t>
-            </a:r>
-            <a:r>
-              <a:rPr lang="en-GB" dirty="0" err="1" smtClean="0"/>
-              <a:t>Gliederungsebene</a:t>
-            </a:r>
-            <a:endParaRPr lang="en-GB" dirty="0" smtClean="0"/>
+              <a:rPr lang="en-US" noProof="0" smtClean="0"/>
+              <a:t>Zweite Gliederungsebene</a:t>
+            </a:r>
           </a:p>
           <a:p>
             <a:pPr lvl="2"/>
             <a:r>
-              <a:rPr lang="en-GB" dirty="0" err="1" smtClean="0"/>
-              <a:t>Dritte</a:t>
-            </a:r>
-            <a:r>
-              <a:rPr lang="en-GB" dirty="0" smtClean="0"/>
-              <a:t> </a:t>
-            </a:r>
-            <a:r>
-              <a:rPr lang="en-GB" dirty="0" err="1" smtClean="0"/>
-              <a:t>Gliederungsebene</a:t>
-            </a:r>
-            <a:endParaRPr lang="en-GB" dirty="0" smtClean="0"/>
+              <a:rPr lang="en-US" noProof="0" smtClean="0"/>
+              <a:t>Dritte Gliederungsebene</a:t>
+            </a:r>
           </a:p>
           <a:p>
             <a:pPr lvl="3"/>
             <a:r>
-              <a:rPr lang="en-GB" dirty="0" err="1" smtClean="0"/>
-              <a:t>Vierte</a:t>
-            </a:r>
-            <a:r>
-              <a:rPr lang="en-GB" dirty="0" smtClean="0"/>
-              <a:t> </a:t>
-            </a:r>
-            <a:r>
-              <a:rPr lang="en-GB" dirty="0" err="1" smtClean="0"/>
-              <a:t>Gliederungsebene</a:t>
-            </a:r>
-            <a:endParaRPr lang="en-GB" dirty="0" smtClean="0"/>
+              <a:rPr lang="en-US" noProof="0" smtClean="0"/>
+              <a:t>Vierte Gliederungsebene</a:t>
+            </a:r>
           </a:p>
           <a:p>
             <a:pPr lvl="4"/>
             <a:r>
-              <a:rPr lang="en-GB" dirty="0" err="1" smtClean="0"/>
-              <a:t>Fünfte</a:t>
-            </a:r>
-            <a:r>
-              <a:rPr lang="en-GB" dirty="0" smtClean="0"/>
-              <a:t> </a:t>
-            </a:r>
-            <a:r>
-              <a:rPr lang="en-GB" dirty="0" err="1" smtClean="0"/>
-              <a:t>Gliederungsebene</a:t>
-            </a:r>
-            <a:endParaRPr lang="en-GB" dirty="0" smtClean="0"/>
+              <a:rPr lang="en-US" noProof="0" smtClean="0"/>
+              <a:t>Fünfte Gliederungsebene</a:t>
+            </a:r>
           </a:p>
           <a:p>
             <a:pPr lvl="4"/>
             <a:r>
-              <a:rPr lang="en-GB" dirty="0" err="1" smtClean="0"/>
-              <a:t>Sechste</a:t>
-            </a:r>
-            <a:r>
-              <a:rPr lang="en-GB" dirty="0" smtClean="0"/>
-              <a:t> </a:t>
-            </a:r>
-            <a:r>
-              <a:rPr lang="en-GB" dirty="0" err="1" smtClean="0"/>
-              <a:t>Gliederungsebene</a:t>
-            </a:r>
-            <a:endParaRPr lang="en-GB" dirty="0" smtClean="0"/>
+              <a:rPr lang="en-US" noProof="0" smtClean="0"/>
+              <a:t>Sechste Gliederungsebene</a:t>
+            </a:r>
           </a:p>
           <a:p>
             <a:pPr lvl="4"/>
             <a:r>
-              <a:rPr lang="en-GB" dirty="0" err="1" smtClean="0"/>
-              <a:t>Siebente</a:t>
-            </a:r>
-            <a:r>
-              <a:rPr lang="en-GB" dirty="0" smtClean="0"/>
-              <a:t> </a:t>
-            </a:r>
-            <a:r>
-              <a:rPr lang="en-GB" dirty="0" err="1" smtClean="0"/>
-              <a:t>Gliederungsebene</a:t>
-            </a:r>
-            <a:endParaRPr lang="en-GB" dirty="0" smtClean="0"/>
+              <a:rPr lang="en-US" noProof="0" smtClean="0"/>
+              <a:t>Siebente Gliederungsebene</a:t>
+            </a:r>
           </a:p>
           <a:p>
             <a:pPr lvl="4"/>
             <a:r>
-              <a:rPr lang="en-GB" dirty="0" err="1" smtClean="0"/>
-              <a:t>Achte</a:t>
-            </a:r>
-            <a:r>
-              <a:rPr lang="en-GB" dirty="0" smtClean="0"/>
-              <a:t> </a:t>
-            </a:r>
-            <a:r>
-              <a:rPr lang="en-GB" dirty="0" err="1" smtClean="0"/>
-              <a:t>Gliederungsebene</a:t>
-            </a:r>
-            <a:endParaRPr lang="en-GB" dirty="0" smtClean="0"/>
+              <a:rPr lang="en-US" noProof="0" smtClean="0"/>
+              <a:t>Achte Gliederungsebene</a:t>
+            </a:r>
           </a:p>
           <a:p>
             <a:pPr lvl="4"/>
             <a:r>
-              <a:rPr lang="en-GB" dirty="0" err="1" smtClean="0"/>
-              <a:t>Neunte</a:t>
-            </a:r>
-            <a:r>
-              <a:rPr lang="en-GB" dirty="0" smtClean="0"/>
-              <a:t> </a:t>
-            </a:r>
-            <a:r>
-              <a:rPr lang="en-GB" dirty="0" err="1" smtClean="0"/>
-              <a:t>Gliederungsebene</a:t>
-            </a:r>
-            <a:endParaRPr lang="en-GB" dirty="0" smtClean="0"/>
+              <a:rPr lang="en-US" noProof="0" smtClean="0"/>
+              <a:t>Neunte Gliederungsebene</a:t>
+            </a:r>
+            <a:endParaRPr lang="en-US" noProof="0" smtClean="0"/>
           </a:p>
         </p:txBody>
       </p:sp>
@@ -6126,8 +5890,8 @@
         </p:nvGrpSpPr>
         <p:grpSpPr bwMode="auto">
           <a:xfrm>
-            <a:off x="3254587" y="5810088"/>
-            <a:ext cx="5637931" cy="400103"/>
+            <a:off x="3581167" y="5810088"/>
+            <a:ext cx="5029433" cy="400103"/>
             <a:chOff x="3035" y="3479"/>
             <a:chExt cx="2305" cy="721"/>
           </a:xfrm>
@@ -6245,7 +6009,7 @@
           </p:blipFill>
           <p:spPr bwMode="auto">
             <a:xfrm>
-              <a:off x="4168" y="3761"/>
+              <a:off x="4318" y="3761"/>
               <a:ext cx="69" cy="314"/>
             </a:xfrm>
             <a:prstGeom prst="rect">
@@ -6262,74 +6026,6 @@
           </p:spPr>
         </p:pic>
       </p:grpSp>
-      <p:sp>
-        <p:nvSpPr>
-          <p:cNvPr id="4101" name="Rectangle 5"/>
-          <p:cNvSpPr>
-            <a:spLocks noChangeArrowheads="1"/>
-          </p:cNvSpPr>
-          <p:nvPr/>
-        </p:nvSpPr>
-        <p:spPr bwMode="auto">
-          <a:xfrm>
-            <a:off x="573088" y="842963"/>
-            <a:ext cx="8074025" cy="290512"/>
-          </a:xfrm>
-          <a:prstGeom prst="rect">
-            <a:avLst/>
-          </a:prstGeom>
-          <a:noFill/>
-          <a:ln w="9525">
-            <a:noFill/>
-            <a:round/>
-            <a:headEnd/>
-            <a:tailEnd/>
-          </a:ln>
-          <a:effectLst/>
-        </p:spPr>
-        <p:txBody>
-          <a:bodyPr lIns="0" tIns="0" rIns="0" bIns="0">
-            <a:spAutoFit/>
-          </a:bodyPr>
-          <a:lstStyle/>
-          <a:p>
-            <a:pPr>
-              <a:buClrTx/>
-              <a:buFontTx/>
-              <a:buNone/>
-              <a:tabLst>
-                <a:tab pos="0" algn="l"/>
-                <a:tab pos="914400" algn="l"/>
-                <a:tab pos="1828800" algn="l"/>
-                <a:tab pos="2743200" algn="l"/>
-                <a:tab pos="3657600" algn="l"/>
-                <a:tab pos="4572000" algn="l"/>
-                <a:tab pos="5486400" algn="l"/>
-                <a:tab pos="6400800" algn="l"/>
-                <a:tab pos="7315200" algn="l"/>
-                <a:tab pos="8229600" algn="l"/>
-                <a:tab pos="9144000" algn="l"/>
-                <a:tab pos="10058400" algn="l"/>
-              </a:tabLst>
-            </a:pPr>
-            <a:r>
-              <a:rPr lang="de-DE" sz="1900" dirty="0" smtClean="0">
-                <a:solidFill>
-                  <a:srgbClr val="0028AD"/>
-                </a:solidFill>
-                <a:latin typeface="+mj-lt"/>
-              </a:rPr>
-              <a:t>.</a:t>
-            </a:r>
-            <a:endParaRPr lang="de-DE" sz="1900" dirty="0">
-              <a:solidFill>
-                <a:srgbClr val="0028AD"/>
-              </a:solidFill>
-              <a:latin typeface="+mj-lt"/>
-            </a:endParaRPr>
-          </a:p>
-        </p:txBody>
-      </p:sp>
       <p:pic>
         <p:nvPicPr>
           <p:cNvPr id="1026" name="Picture 2" descr="Y:\VMWare\SC20120326-105854.png"/>
@@ -7021,18 +6717,10 @@
           <a:lstStyle/>
           <a:p>
             <a:r>
-              <a:rPr lang="de-CH" dirty="0" err="1" smtClean="0"/>
-              <a:t>Discussion</a:t>
-            </a:r>
-            <a:r>
-              <a:rPr lang="de-CH" dirty="0" smtClean="0"/>
-              <a:t> – Future </a:t>
-            </a:r>
-            <a:r>
-              <a:rPr lang="de-CH" dirty="0" err="1" smtClean="0"/>
-              <a:t>work</a:t>
-            </a:r>
-            <a:endParaRPr lang="de-CH" dirty="0"/>
+              <a:rPr lang="en-US" dirty="0" smtClean="0"/>
+              <a:t>Discussion – Future work</a:t>
+            </a:r>
+            <a:endParaRPr lang="en-US" dirty="0"/>
           </a:p>
         </p:txBody>
       </p:sp>
@@ -7056,22 +6744,9 @@
               <a:buChar char="-"/>
             </a:pPr>
             <a:r>
-              <a:rPr lang="de-CH" sz="2000" dirty="0" smtClean="0"/>
-              <a:t>in </a:t>
-            </a:r>
-            <a:r>
-              <a:rPr lang="de-CH" sz="2000" dirty="0" err="1" smtClean="0"/>
-              <a:t>game</a:t>
-            </a:r>
-            <a:r>
-              <a:rPr lang="de-CH" sz="2000" dirty="0" smtClean="0"/>
-              <a:t> </a:t>
-            </a:r>
-            <a:r>
-              <a:rPr lang="de-CH" sz="2000" dirty="0" err="1" smtClean="0"/>
-              <a:t>sound</a:t>
-            </a:r>
-            <a:endParaRPr lang="de-CH" sz="2000" dirty="0" smtClean="0"/>
+              <a:rPr lang="en-US" sz="2000" dirty="0" smtClean="0"/>
+              <a:t>in game sound</a:t>
+            </a:r>
           </a:p>
           <a:p>
             <a:pPr>
@@ -7079,26 +6754,9 @@
               <a:buChar char="-"/>
             </a:pPr>
             <a:r>
-              <a:rPr lang="de-CH" sz="2000" dirty="0" err="1" smtClean="0"/>
-              <a:t>reconnect</a:t>
-            </a:r>
-            <a:r>
-              <a:rPr lang="de-CH" sz="2000" dirty="0" smtClean="0"/>
-              <a:t> after a </a:t>
-            </a:r>
-            <a:r>
-              <a:rPr lang="de-CH" sz="2000" dirty="0" err="1" smtClean="0"/>
-              <a:t>connection</a:t>
-            </a:r>
-            <a:r>
-              <a:rPr lang="de-CH" sz="2000" dirty="0" smtClean="0"/>
-              <a:t> </a:t>
-            </a:r>
-            <a:r>
-              <a:rPr lang="de-CH" sz="2000" dirty="0" err="1" smtClean="0"/>
-              <a:t>loss</a:t>
-            </a:r>
-            <a:endParaRPr lang="de-CH" sz="2000" dirty="0" smtClean="0"/>
+              <a:rPr lang="en-US" sz="2000" dirty="0" smtClean="0"/>
+              <a:t>reconnect after a connection loss</a:t>
+            </a:r>
           </a:p>
           <a:p>
             <a:pPr>
@@ -7106,28 +6764,8 @@
               <a:buChar char="-"/>
             </a:pPr>
             <a:r>
-              <a:rPr lang="de-CH" sz="2000" dirty="0" err="1" smtClean="0"/>
-              <a:t>improved</a:t>
-            </a:r>
-            <a:r>
-              <a:rPr lang="de-CH" sz="2000" dirty="0" smtClean="0"/>
-              <a:t> </a:t>
-            </a:r>
-            <a:r>
-              <a:rPr lang="de-CH" sz="2000" dirty="0" err="1" smtClean="0"/>
-              <a:t>graphics</a:t>
-            </a:r>
-            <a:r>
-              <a:rPr lang="de-CH" sz="2000" dirty="0" smtClean="0"/>
-              <a:t> (</a:t>
-            </a:r>
-            <a:r>
-              <a:rPr lang="de-CH" sz="2000" dirty="0" err="1" smtClean="0"/>
-              <a:t>more</a:t>
-            </a:r>
-            <a:r>
-              <a:rPr lang="de-CH" sz="2000" dirty="0" smtClean="0"/>
-              <a:t> 3D)</a:t>
+              <a:rPr lang="en-US" sz="2000" dirty="0" smtClean="0"/>
+              <a:t>improved graphics (more 3D)</a:t>
             </a:r>
           </a:p>
           <a:p>
@@ -7136,26 +6774,9 @@
               <a:buChar char="-"/>
             </a:pPr>
             <a:r>
-              <a:rPr lang="de-CH" sz="2000" dirty="0" err="1" smtClean="0"/>
-              <a:t>connection</a:t>
-            </a:r>
-            <a:r>
-              <a:rPr lang="de-CH" sz="2000" dirty="0" smtClean="0"/>
-              <a:t> </a:t>
-            </a:r>
-            <a:r>
-              <a:rPr lang="de-CH" sz="2000" dirty="0" err="1" smtClean="0"/>
-              <a:t>over</a:t>
-            </a:r>
-            <a:r>
-              <a:rPr lang="de-CH" sz="2000" dirty="0" smtClean="0"/>
-              <a:t> </a:t>
-            </a:r>
-            <a:r>
-              <a:rPr lang="de-CH" sz="2000" dirty="0" err="1" smtClean="0"/>
-              <a:t>bluetooth</a:t>
-            </a:r>
-            <a:endParaRPr lang="de-CH" sz="2000" dirty="0" smtClean="0"/>
+              <a:rPr lang="en-US" sz="2000" dirty="0" smtClean="0"/>
+              <a:t>connection over Bluetooth</a:t>
+            </a:r>
           </a:p>
           <a:p>
             <a:pPr>
@@ -7163,28 +6784,8 @@
               <a:buChar char="-"/>
             </a:pPr>
             <a:r>
-              <a:rPr lang="de-CH" sz="2000" dirty="0" err="1" smtClean="0"/>
-              <a:t>master</a:t>
-            </a:r>
-            <a:r>
-              <a:rPr lang="de-CH" sz="2000" dirty="0" smtClean="0"/>
-              <a:t> </a:t>
-            </a:r>
-            <a:r>
-              <a:rPr lang="de-CH" sz="2000" dirty="0" err="1" smtClean="0"/>
-              <a:t>automatically</a:t>
-            </a:r>
-            <a:r>
-              <a:rPr lang="de-CH" sz="2000" dirty="0" smtClean="0"/>
-              <a:t> </a:t>
-            </a:r>
-            <a:r>
-              <a:rPr lang="de-CH" sz="2000" dirty="0" err="1" smtClean="0"/>
-              <a:t>detectable</a:t>
-            </a:r>
-            <a:r>
-              <a:rPr lang="de-CH" sz="2000" dirty="0" smtClean="0"/>
-              <a:t> in LAN</a:t>
+              <a:rPr lang="en-US" sz="2000" dirty="0" smtClean="0"/>
+              <a:t>master automatically detectable in LAN</a:t>
             </a:r>
           </a:p>
           <a:p>
@@ -7193,60 +6794,17 @@
               <a:buChar char="-"/>
             </a:pPr>
             <a:r>
-              <a:rPr lang="de-CH" sz="2000" dirty="0" err="1" smtClean="0"/>
-              <a:t>thrilling</a:t>
-            </a:r>
-            <a:r>
-              <a:rPr lang="de-CH" sz="2000" dirty="0" smtClean="0"/>
-              <a:t> </a:t>
-            </a:r>
-            <a:r>
-              <a:rPr lang="de-CH" sz="2000" dirty="0" err="1" smtClean="0"/>
+              <a:rPr lang="en-US" sz="2000" dirty="0" smtClean="0"/>
+              <a:t>thrilling </a:t>
+            </a:r>
+            <a:r>
+              <a:rPr lang="en-US" sz="2000" dirty="0" err="1" smtClean="0"/>
               <a:t>gameplay</a:t>
             </a:r>
             <a:r>
-              <a:rPr lang="de-CH" sz="2000" dirty="0" smtClean="0"/>
-              <a:t> (different </a:t>
-            </a:r>
-            <a:r>
-              <a:rPr lang="de-CH" sz="2000" dirty="0" err="1" smtClean="0"/>
-              <a:t>weapons</a:t>
-            </a:r>
-            <a:r>
-              <a:rPr lang="de-CH" sz="2000" dirty="0" smtClean="0"/>
-              <a:t> </a:t>
-            </a:r>
-            <a:r>
-              <a:rPr lang="de-CH" sz="2000" dirty="0" err="1" smtClean="0"/>
-              <a:t>etc</a:t>
-            </a:r>
-            <a:r>
-              <a:rPr lang="de-CH" sz="2000" dirty="0" smtClean="0"/>
-              <a:t>…)</a:t>
-            </a:r>
-          </a:p>
-          <a:p>
-            <a:pPr>
-              <a:buFontTx/>
-              <a:buChar char="-"/>
-            </a:pPr>
-            <a:r>
-              <a:rPr lang="de-CH" sz="2000" dirty="0" smtClean="0"/>
-              <a:t>in </a:t>
-            </a:r>
-            <a:r>
-              <a:rPr lang="de-CH" sz="2000" dirty="0" err="1" smtClean="0"/>
-              <a:t>game</a:t>
-            </a:r>
-            <a:r>
-              <a:rPr lang="de-CH" sz="2000" dirty="0" smtClean="0"/>
-              <a:t> </a:t>
-            </a:r>
-            <a:r>
-              <a:rPr lang="de-CH" sz="2000" dirty="0" err="1" smtClean="0"/>
-              <a:t>ads</a:t>
-            </a:r>
-            <a:endParaRPr lang="de-CH" sz="2000" dirty="0"/>
+              <a:rPr lang="en-US" sz="2000" dirty="0" smtClean="0"/>
+              <a:t> (different weapons etc…)</a:t>
+            </a:r>
           </a:p>
         </p:txBody>
       </p:sp>
@@ -7632,67 +7190,6 @@
                       </p:childTnLst>
                     </p:cTn>
                   </p:par>
-                  <p:par>
-                    <p:cTn id="33" fill="hold">
-                      <p:stCondLst>
-                        <p:cond delay="indefinite"/>
-                      </p:stCondLst>
-                      <p:childTnLst>
-                        <p:par>
-                          <p:cTn id="34" fill="hold">
-                            <p:stCondLst>
-                              <p:cond delay="0"/>
-                            </p:stCondLst>
-                            <p:childTnLst>
-                              <p:par>
-                                <p:cTn id="35" presetID="10" presetClass="entr" presetSubtype="0" fill="hold" grpId="0" nodeType="clickEffect">
-                                  <p:stCondLst>
-                                    <p:cond delay="0"/>
-                                  </p:stCondLst>
-                                  <p:childTnLst>
-                                    <p:set>
-                                      <p:cBhvr>
-                                        <p:cTn id="36" dur="1" fill="hold">
-                                          <p:stCondLst>
-                                            <p:cond delay="0"/>
-                                          </p:stCondLst>
-                                        </p:cTn>
-                                        <p:tgtEl>
-                                          <p:spTgt spid="3">
-                                            <p:txEl>
-                                              <p:pRg st="6" end="6"/>
-                                            </p:txEl>
-                                          </p:spTgt>
-                                        </p:tgtEl>
-                                        <p:attrNameLst>
-                                          <p:attrName>style.visibility</p:attrName>
-                                        </p:attrNameLst>
-                                      </p:cBhvr>
-                                      <p:to>
-                                        <p:strVal val="visible"/>
-                                      </p:to>
-                                    </p:set>
-                                    <p:animEffect transition="in" filter="fade">
-                                      <p:cBhvr>
-                                        <p:cTn id="37" dur="500"/>
-                                        <p:tgtEl>
-                                          <p:spTgt spid="3">
-                                            <p:txEl>
-                                              <p:pRg st="6" end="6"/>
-                                            </p:txEl>
-                                          </p:spTgt>
-                                        </p:tgtEl>
-                                      </p:cBhvr>
-                                    </p:animEffect>
-                                  </p:childTnLst>
-                                </p:cTn>
-                              </p:par>
-                            </p:childTnLst>
-                          </p:cTn>
-                        </p:par>
-                      </p:childTnLst>
-                    </p:cTn>
-                  </p:par>
                 </p:childTnLst>
               </p:cTn>
               <p:prevCondLst>
@@ -7722,6 +7219,87 @@
 </file>
 
 <file path=ppt/slides/slide12.xml><?xml version="1.0" encoding="utf-8"?>
+<p:sld xmlns:a="http://schemas.openxmlformats.org/drawingml/2006/main" xmlns:r="http://schemas.openxmlformats.org/officeDocument/2006/relationships" xmlns:p="http://schemas.openxmlformats.org/presentationml/2006/main">
+  <p:cSld>
+    <p:spTree>
+      <p:nvGrpSpPr>
+        <p:cNvPr id="1" name=""/>
+        <p:cNvGrpSpPr/>
+        <p:nvPr/>
+      </p:nvGrpSpPr>
+      <p:grpSpPr>
+        <a:xfrm>
+          <a:off x="0" y="0"/>
+          <a:ext cx="0" cy="0"/>
+          <a:chOff x="0" y="0"/>
+          <a:chExt cx="0" cy="0"/>
+        </a:xfrm>
+      </p:grpSpPr>
+      <p:sp>
+        <p:nvSpPr>
+          <p:cNvPr id="2" name="Titel 1"/>
+          <p:cNvSpPr>
+            <a:spLocks noGrp="1"/>
+          </p:cNvSpPr>
+          <p:nvPr>
+            <p:ph type="title"/>
+          </p:nvPr>
+        </p:nvSpPr>
+        <p:spPr/>
+        <p:txBody>
+          <a:bodyPr/>
+          <a:lstStyle/>
+          <a:p>
+            <a:r>
+              <a:rPr lang="de-CH" dirty="0" smtClean="0"/>
+              <a:t>Demo</a:t>
+            </a:r>
+            <a:endParaRPr lang="de-CH" dirty="0"/>
+          </a:p>
+        </p:txBody>
+      </p:sp>
+      <p:pic>
+        <p:nvPicPr>
+          <p:cNvPr id="4" name="Inhaltsplatzhalter 3" descr="Starshooter_ninja_tux.png"/>
+          <p:cNvPicPr>
+            <a:picLocks noGrp="1" noChangeAspect="1"/>
+          </p:cNvPicPr>
+          <p:nvPr>
+            <p:ph idx="1"/>
+          </p:nvPr>
+        </p:nvPicPr>
+        <p:blipFill>
+          <a:blip r:embed="rId2" cstate="print"/>
+          <a:stretch>
+            <a:fillRect/>
+          </a:stretch>
+        </p:blipFill>
+        <p:spPr>
+          <a:xfrm>
+            <a:off x="2231571" y="1572757"/>
+            <a:ext cx="4876191" cy="4876191"/>
+          </a:xfrm>
+        </p:spPr>
+      </p:pic>
+    </p:spTree>
+  </p:cSld>
+  <p:clrMapOvr>
+    <a:masterClrMapping/>
+  </p:clrMapOvr>
+  <p:transition>
+    <p:fade thruBlk="1"/>
+  </p:transition>
+  <p:timing>
+    <p:tnLst>
+      <p:par>
+        <p:cTn id="1" dur="indefinite" restart="never" nodeType="tmRoot"/>
+      </p:par>
+    </p:tnLst>
+  </p:timing>
+</p:sld>
+</file>
+
+<file path=ppt/slides/slide13.xml><?xml version="1.0" encoding="utf-8"?>
 <p:sld xmlns:a="http://schemas.openxmlformats.org/drawingml/2006/main" xmlns:r="http://schemas.openxmlformats.org/officeDocument/2006/relationships" xmlns:p="http://schemas.openxmlformats.org/presentationml/2006/main">
   <p:cSld>
     <p:spTree>
@@ -7844,18 +7422,10 @@
           <a:lstStyle/>
           <a:p>
             <a:r>
-              <a:rPr lang="de-CH" dirty="0" smtClean="0"/>
-              <a:t>Table </a:t>
-            </a:r>
-            <a:r>
-              <a:rPr lang="de-CH" dirty="0" err="1" smtClean="0"/>
-              <a:t>of</a:t>
-            </a:r>
-            <a:r>
-              <a:rPr lang="de-CH" dirty="0" smtClean="0"/>
-              <a:t> Contents</a:t>
-            </a:r>
-            <a:endParaRPr lang="de-CH" dirty="0"/>
+              <a:rPr lang="en-US" dirty="0" smtClean="0"/>
+              <a:t>Table of Contents</a:t>
+            </a:r>
+            <a:endParaRPr lang="en-US" dirty="0"/>
           </a:p>
         </p:txBody>
       </p:sp>
@@ -7879,7 +7449,7 @@
               <a:buChar char="-"/>
             </a:pPr>
             <a:r>
-              <a:rPr lang="de-CH" sz="2000" dirty="0" smtClean="0"/>
+              <a:rPr lang="en-US" sz="2000" dirty="0" smtClean="0"/>
               <a:t>Intro</a:t>
             </a:r>
           </a:p>
@@ -7889,7 +7459,7 @@
               <a:buChar char="-"/>
             </a:pPr>
             <a:r>
-              <a:rPr lang="de-CH" sz="2000" dirty="0" smtClean="0"/>
+              <a:rPr lang="en-US" sz="2000" dirty="0" smtClean="0"/>
               <a:t>Background</a:t>
             </a:r>
           </a:p>
@@ -7899,14 +7469,9 @@
               <a:buChar char="-"/>
             </a:pPr>
             <a:r>
-              <a:rPr lang="de-CH" sz="2000" dirty="0" smtClean="0"/>
-              <a:t>Design / </a:t>
-            </a:r>
-            <a:r>
-              <a:rPr lang="de-CH" sz="2000" dirty="0" err="1" smtClean="0"/>
-              <a:t>Architecture</a:t>
-            </a:r>
-            <a:endParaRPr lang="de-CH" sz="2000" dirty="0" smtClean="0"/>
+              <a:rPr lang="en-US" sz="2000" dirty="0" smtClean="0"/>
+              <a:t>Design / Architecture</a:t>
+            </a:r>
           </a:p>
           <a:p>
             <a:pPr>
@@ -7914,10 +7479,9 @@
               <a:buChar char="-"/>
             </a:pPr>
             <a:r>
-              <a:rPr lang="de-CH" sz="2000" dirty="0" err="1" smtClean="0"/>
+              <a:rPr lang="en-US" sz="2000" dirty="0" smtClean="0"/>
               <a:t>Testing</a:t>
             </a:r>
-            <a:endParaRPr lang="de-CH" sz="2000" dirty="0" smtClean="0"/>
           </a:p>
           <a:p>
             <a:pPr>
@@ -7925,31 +7489,41 @@
               <a:buChar char="-"/>
             </a:pPr>
             <a:r>
-              <a:rPr lang="de-CH" sz="2000" dirty="0" err="1" smtClean="0"/>
-              <a:t>Discussion</a:t>
-            </a:r>
-            <a:endParaRPr lang="de-CH" sz="2000" dirty="0" smtClean="0"/>
+              <a:rPr lang="en-US" sz="2000" dirty="0" smtClean="0"/>
+              <a:t>Demo</a:t>
+            </a:r>
+            <a:endParaRPr lang="en-US" sz="2000" dirty="0" smtClean="0"/>
           </a:p>
           <a:p>
             <a:pPr>
               <a:buFontTx/>
               <a:buChar char="-"/>
             </a:pPr>
-            <a:endParaRPr lang="de-CH" sz="2000" dirty="0" smtClean="0"/>
+            <a:r>
+              <a:rPr lang="en-US" sz="2000" dirty="0" smtClean="0"/>
+              <a:t>Discussion</a:t>
+            </a:r>
           </a:p>
           <a:p>
             <a:pPr>
               <a:buFontTx/>
               <a:buChar char="-"/>
             </a:pPr>
-            <a:endParaRPr lang="de-CH" sz="2000" dirty="0" smtClean="0"/>
+            <a:endParaRPr lang="en-US" sz="2000" dirty="0" smtClean="0"/>
           </a:p>
           <a:p>
             <a:pPr>
               <a:buFontTx/>
               <a:buChar char="-"/>
             </a:pPr>
-            <a:endParaRPr lang="de-CH" sz="2000" dirty="0"/>
+            <a:endParaRPr lang="en-US" sz="2000" dirty="0" smtClean="0"/>
+          </a:p>
+          <a:p>
+            <a:pPr>
+              <a:buFontTx/>
+              <a:buChar char="-"/>
+            </a:pPr>
+            <a:endParaRPr lang="en-US" sz="2000" dirty="0"/>
           </a:p>
         </p:txBody>
       </p:sp>
@@ -8027,28 +7601,8 @@
           <a:lstStyle/>
           <a:p>
             <a:r>
-              <a:rPr lang="de-CH" sz="2000" dirty="0" err="1" smtClean="0"/>
-              <a:t>Gain</a:t>
-            </a:r>
-            <a:r>
-              <a:rPr lang="de-CH" sz="2000" dirty="0" smtClean="0"/>
-              <a:t> </a:t>
-            </a:r>
-            <a:r>
-              <a:rPr lang="de-CH" sz="2000" dirty="0" err="1" smtClean="0"/>
-              <a:t>some</a:t>
-            </a:r>
-            <a:r>
-              <a:rPr lang="de-CH" sz="2000" dirty="0" smtClean="0"/>
-              <a:t> </a:t>
-            </a:r>
-            <a:r>
-              <a:rPr lang="de-CH" sz="2000" dirty="0" err="1" smtClean="0"/>
-              <a:t>knowledge</a:t>
-            </a:r>
-            <a:r>
-              <a:rPr lang="de-CH" sz="2000" dirty="0" smtClean="0"/>
-              <a:t> in …</a:t>
+              <a:rPr lang="en-US" sz="2000" dirty="0" smtClean="0"/>
+              <a:t>Gain some knowledge in …</a:t>
             </a:r>
           </a:p>
           <a:p>
@@ -8057,14 +7611,9 @@
               <a:buChar char="-"/>
             </a:pPr>
             <a:r>
-              <a:rPr lang="de-CH" sz="2000" dirty="0" smtClean="0"/>
-              <a:t>… </a:t>
-            </a:r>
-            <a:r>
-              <a:rPr lang="de-CH" sz="2000" dirty="0" err="1" smtClean="0"/>
+              <a:rPr lang="en-US" sz="2000" dirty="0" smtClean="0"/>
               <a:t>OpenGL</a:t>
             </a:r>
-            <a:endParaRPr lang="de-CH" sz="2000" dirty="0" smtClean="0"/>
           </a:p>
           <a:p>
             <a:pPr>
@@ -8072,14 +7621,13 @@
               <a:buChar char="-"/>
             </a:pPr>
             <a:r>
-              <a:rPr lang="de-CH" sz="2000" dirty="0" smtClean="0"/>
-              <a:t>… </a:t>
-            </a:r>
-            <a:r>
-              <a:rPr lang="de-CH" sz="2000" dirty="0" err="1" smtClean="0"/>
-              <a:t>sensors</a:t>
-            </a:r>
-            <a:endParaRPr lang="de-CH" sz="2000" dirty="0" smtClean="0"/>
+              <a:rPr lang="en-US" sz="2000" dirty="0" smtClean="0"/>
+              <a:t>s</a:t>
+            </a:r>
+            <a:r>
+              <a:rPr lang="en-US" sz="2000" dirty="0" smtClean="0"/>
+              <a:t>ensors</a:t>
+            </a:r>
           </a:p>
           <a:p>
             <a:pPr>
@@ -8087,14 +7635,9 @@
               <a:buChar char="-"/>
             </a:pPr>
             <a:r>
-              <a:rPr lang="de-CH" sz="2000" dirty="0" smtClean="0"/>
-              <a:t>… </a:t>
-            </a:r>
-            <a:r>
-              <a:rPr lang="de-CH" sz="2000" dirty="0" err="1" smtClean="0"/>
+              <a:rPr lang="en-US" sz="2000" dirty="0" smtClean="0"/>
               <a:t>networking</a:t>
             </a:r>
-            <a:endParaRPr lang="de-CH" sz="2000" dirty="0" smtClean="0"/>
           </a:p>
           <a:p>
             <a:pPr>
@@ -8102,16 +7645,8 @@
               <a:buChar char="-"/>
             </a:pPr>
             <a:r>
-              <a:rPr lang="de-CH" sz="2000" dirty="0" smtClean="0"/>
-              <a:t>… </a:t>
-            </a:r>
-            <a:r>
-              <a:rPr lang="de-CH" sz="2000" dirty="0" err="1" smtClean="0"/>
-              <a:t>general</a:t>
-            </a:r>
-            <a:r>
-              <a:rPr lang="de-CH" sz="2000" dirty="0" smtClean="0"/>
-              <a:t> gamedesign</a:t>
+              <a:rPr lang="en-US" sz="2000" dirty="0" smtClean="0"/>
+              <a:t>general game-design</a:t>
             </a:r>
           </a:p>
           <a:p>
@@ -8120,14 +7655,10 @@
               <a:buChar char="-"/>
             </a:pPr>
             <a:r>
-              <a:rPr lang="de-CH" sz="2000" dirty="0" smtClean="0"/>
-              <a:t>… </a:t>
-            </a:r>
-            <a:r>
-              <a:rPr lang="de-CH" sz="2000" dirty="0" err="1" smtClean="0"/>
+              <a:rPr lang="en-US" sz="2000" dirty="0" smtClean="0"/>
               <a:t>Android</a:t>
             </a:r>
-            <a:endParaRPr lang="de-CH" sz="2000" dirty="0"/>
+            <a:endParaRPr lang="en-US" sz="2000" dirty="0"/>
           </a:p>
         </p:txBody>
       </p:sp>
@@ -8205,46 +7736,18 @@
           <a:lstStyle/>
           <a:p>
             <a:r>
-              <a:rPr lang="de-CH" sz="2000" dirty="0" err="1" smtClean="0"/>
-              <a:t>Having</a:t>
-            </a:r>
-            <a:r>
-              <a:rPr lang="de-CH" sz="2000" dirty="0" smtClean="0"/>
-              <a:t> a </a:t>
-            </a:r>
-            <a:r>
-              <a:rPr lang="de-CH" sz="2000" dirty="0" err="1" smtClean="0"/>
-              <a:t>game</a:t>
-            </a:r>
-            <a:r>
-              <a:rPr lang="de-CH" sz="2000" dirty="0" smtClean="0"/>
-              <a:t> </a:t>
-            </a:r>
-            <a:r>
-              <a:rPr lang="de-CH" sz="2000" dirty="0" err="1" smtClean="0"/>
-              <a:t>that</a:t>
-            </a:r>
-            <a:r>
-              <a:rPr lang="de-CH" sz="2000" dirty="0" smtClean="0"/>
-              <a:t> ‘</a:t>
-            </a:r>
-            <a:r>
-              <a:rPr lang="de-CH" sz="2000" dirty="0" err="1" smtClean="0"/>
-              <a:t>works</a:t>
-            </a:r>
-            <a:r>
-              <a:rPr lang="de-CH" sz="2000" dirty="0" smtClean="0"/>
-              <a:t>‘ </a:t>
-            </a:r>
-            <a:r>
-              <a:rPr lang="de-CH" sz="2000" dirty="0" smtClean="0">
+              <a:rPr lang="en-US" sz="2000" dirty="0" smtClean="0"/>
+              <a:t>Having a game that ‘works‘ </a:t>
+            </a:r>
+            <a:r>
+              <a:rPr lang="en-US" sz="2000" dirty="0" smtClean="0">
                 <a:sym typeface="Wingdings" pitchFamily="2" charset="2"/>
               </a:rPr>
               <a:t></a:t>
             </a:r>
           </a:p>
           <a:p>
-            <a:endParaRPr lang="de-CH" sz="2000" dirty="0" smtClean="0"/>
+            <a:endParaRPr lang="en-US" sz="2000" dirty="0" smtClean="0"/>
           </a:p>
           <a:p>
             <a:pPr>
@@ -8252,34 +7755,9 @@
               <a:buChar char="-"/>
             </a:pPr>
             <a:r>
-              <a:rPr lang="de-CH" sz="2000" dirty="0" err="1" smtClean="0"/>
-              <a:t>intuitively</a:t>
-            </a:r>
-            <a:r>
-              <a:rPr lang="de-CH" sz="2000" dirty="0" smtClean="0"/>
-              <a:t> </a:t>
-            </a:r>
-            <a:r>
-              <a:rPr lang="de-CH" sz="2000" dirty="0" err="1" smtClean="0"/>
-              <a:t>controllable</a:t>
-            </a:r>
-            <a:r>
-              <a:rPr lang="de-CH" sz="2000" dirty="0" smtClean="0"/>
-              <a:t> </a:t>
-            </a:r>
-            <a:r>
-              <a:rPr lang="de-CH" sz="2000" dirty="0" err="1" smtClean="0"/>
-              <a:t>by</a:t>
-            </a:r>
-            <a:r>
-              <a:rPr lang="de-CH" sz="2000" dirty="0" smtClean="0"/>
-              <a:t> </a:t>
-            </a:r>
-            <a:r>
-              <a:rPr lang="de-CH" sz="2000" dirty="0" err="1" smtClean="0"/>
-              <a:t>sensor</a:t>
-            </a:r>
-            <a:endParaRPr lang="de-CH" sz="2000" dirty="0" smtClean="0"/>
+              <a:rPr lang="en-US" sz="2000" dirty="0" smtClean="0"/>
+              <a:t>intuitively controllable by sensor</a:t>
+            </a:r>
           </a:p>
           <a:p>
             <a:pPr>
@@ -8287,40 +7765,23 @@
               <a:buChar char="-"/>
             </a:pPr>
             <a:r>
-              <a:rPr lang="de-CH" sz="2000" dirty="0" err="1" smtClean="0"/>
-              <a:t>playable</a:t>
-            </a:r>
-            <a:r>
-              <a:rPr lang="de-CH" sz="2000" dirty="0" smtClean="0"/>
-              <a:t> </a:t>
-            </a:r>
-            <a:r>
-              <a:rPr lang="de-CH" sz="2000" dirty="0" err="1" smtClean="0"/>
-              <a:t>over</a:t>
-            </a:r>
-            <a:r>
-              <a:rPr lang="de-CH" sz="2000" dirty="0" smtClean="0"/>
-              <a:t> </a:t>
-            </a:r>
-            <a:r>
-              <a:rPr lang="de-CH" sz="2000" dirty="0" err="1" smtClean="0"/>
-              <a:t>network</a:t>
-            </a:r>
-            <a:endParaRPr lang="de-CH" sz="2000" dirty="0" smtClean="0"/>
+              <a:rPr lang="en-US" sz="2000" dirty="0" smtClean="0"/>
+              <a:t>playable over network</a:t>
+            </a:r>
           </a:p>
           <a:p>
             <a:pPr>
               <a:buFontTx/>
               <a:buChar char="-"/>
             </a:pPr>
-            <a:endParaRPr lang="de-CH" sz="2000" dirty="0" smtClean="0"/>
+            <a:endParaRPr lang="en-US" sz="2000" dirty="0" smtClean="0"/>
           </a:p>
           <a:p>
             <a:pPr>
               <a:buFontTx/>
               <a:buChar char="-"/>
             </a:pPr>
-            <a:endParaRPr lang="de-CH" sz="2000" dirty="0"/>
+            <a:endParaRPr lang="en-US" sz="2000" dirty="0"/>
           </a:p>
         </p:txBody>
       </p:sp>
@@ -8646,66 +8107,9 @@
               <a:buChar char="-"/>
             </a:pPr>
             <a:r>
-              <a:rPr lang="de-CH" sz="2000" dirty="0" err="1" smtClean="0"/>
-              <a:t>good</a:t>
-            </a:r>
-            <a:r>
-              <a:rPr lang="de-CH" sz="2000" dirty="0" smtClean="0"/>
-              <a:t> </a:t>
-            </a:r>
-            <a:r>
-              <a:rPr lang="de-CH" sz="2000" dirty="0" err="1" smtClean="0"/>
-              <a:t>introduction</a:t>
-            </a:r>
-            <a:r>
-              <a:rPr lang="de-CH" sz="2000" dirty="0" smtClean="0"/>
-              <a:t> </a:t>
-            </a:r>
-            <a:r>
-              <a:rPr lang="de-CH" sz="2000" dirty="0" err="1" smtClean="0"/>
-              <a:t>to</a:t>
-            </a:r>
-            <a:r>
-              <a:rPr lang="de-CH" sz="2000" dirty="0" smtClean="0"/>
-              <a:t> </a:t>
-            </a:r>
-            <a:r>
-              <a:rPr lang="de-CH" sz="2000" dirty="0" err="1" smtClean="0"/>
-              <a:t>OpenGL</a:t>
-            </a:r>
-            <a:r>
-              <a:rPr lang="de-CH" sz="2000" dirty="0" smtClean="0"/>
-              <a:t> ES </a:t>
-            </a:r>
-            <a:r>
-              <a:rPr lang="de-CH" sz="2000" dirty="0" err="1" smtClean="0"/>
-              <a:t>based</a:t>
-            </a:r>
-            <a:r>
-              <a:rPr lang="de-CH" sz="2000" dirty="0" smtClean="0"/>
-              <a:t> </a:t>
-            </a:r>
-            <a:r>
-              <a:rPr lang="de-CH" sz="2000" dirty="0" err="1" smtClean="0"/>
-              <a:t>game</a:t>
-            </a:r>
-            <a:r>
-              <a:rPr lang="de-CH" sz="2000" dirty="0" smtClean="0"/>
-              <a:t> design </a:t>
-            </a:r>
-            <a:r>
-              <a:rPr lang="de-CH" sz="2000" dirty="0" err="1" smtClean="0"/>
-              <a:t>for</a:t>
-            </a:r>
-            <a:r>
-              <a:rPr lang="de-CH" sz="2000" dirty="0" smtClean="0"/>
-              <a:t> </a:t>
-            </a:r>
-            <a:r>
-              <a:rPr lang="de-CH" sz="2000" dirty="0" err="1" smtClean="0"/>
-              <a:t>Android</a:t>
-            </a:r>
-            <a:endParaRPr lang="de-CH" sz="2000" dirty="0" smtClean="0"/>
+              <a:rPr lang="en-US" sz="2000" dirty="0" smtClean="0"/>
+              <a:t>good introduction to OpenGL ES based game design for Android</a:t>
+            </a:r>
           </a:p>
           <a:p>
             <a:pPr>
@@ -8713,45 +8117,12 @@
               <a:buChar char="-"/>
             </a:pPr>
             <a:r>
-              <a:rPr lang="de-CH" sz="2000" dirty="0" err="1" smtClean="0"/>
-              <a:t>architectural</a:t>
-            </a:r>
-            <a:r>
-              <a:rPr lang="de-CH" sz="2000" dirty="0" smtClean="0"/>
-              <a:t> </a:t>
-            </a:r>
-            <a:r>
-              <a:rPr lang="de-CH" sz="2000" dirty="0" err="1" smtClean="0"/>
-              <a:t>basis</a:t>
-            </a:r>
-            <a:r>
-              <a:rPr lang="de-CH" sz="2000" dirty="0" smtClean="0"/>
-              <a:t> </a:t>
-            </a:r>
-            <a:r>
-              <a:rPr lang="de-CH" sz="2000" dirty="0" err="1" smtClean="0"/>
-              <a:t>of</a:t>
-            </a:r>
-            <a:r>
-              <a:rPr lang="de-CH" sz="2000" dirty="0" smtClean="0"/>
-              <a:t> </a:t>
-            </a:r>
-            <a:r>
-              <a:rPr lang="de-CH" sz="2000" dirty="0" err="1" smtClean="0"/>
-              <a:t>our</a:t>
-            </a:r>
-            <a:r>
-              <a:rPr lang="de-CH" sz="2000" dirty="0" smtClean="0"/>
-              <a:t> </a:t>
-            </a:r>
-            <a:r>
-              <a:rPr lang="de-CH" sz="2000" dirty="0" err="1" smtClean="0"/>
-              <a:t>implementation</a:t>
-            </a:r>
-            <a:endParaRPr lang="de-CH" sz="2000" dirty="0" smtClean="0"/>
-          </a:p>
-          <a:p>
-            <a:endParaRPr lang="de-CH" sz="2000" dirty="0" smtClean="0"/>
+              <a:rPr lang="en-US" sz="2000" dirty="0" smtClean="0"/>
+              <a:t>architectural basis of our implementation</a:t>
+            </a:r>
+          </a:p>
+          <a:p>
+            <a:endParaRPr lang="en-US" sz="2000" dirty="0" smtClean="0"/>
           </a:p>
         </p:txBody>
       </p:sp>

</xml_diff>